<commit_message>
Tweaks made during pre-lecture review
</commit_message>
<xml_diff>
--- a/01-intro/lec.pptx
+++ b/01-intro/lec.pptx
@@ -250,7 +250,7 @@
           <a:p>
             <a:fld id="{5367F125-181F-9A48-A24E-AAD89CB055B5}" type="datetimeFigureOut">
               <a:rPr lang="en-US" smtClean="0"/>
-              <a:t>8/28/19</a:t>
+              <a:t>8/29/19</a:t>
             </a:fld>
             <a:endParaRPr lang="en-US"/>
           </a:p>
@@ -2284,126 +2284,10 @@
             <a:endParaRPr lang="en-US" baseline="0" dirty="0"/>
           </a:p>
           <a:p>
-            <a:pPr lvl="1"/>
-            <a:r>
-              <a:rPr lang="en-US" dirty="0">
-                <a:solidFill>
-                  <a:schemeClr val="tx2"/>
-                </a:solidFill>
-              </a:rPr>
-              <a:t>In math, if </a:t>
-            </a:r>
-            <a:r>
-              <a:rPr lang="en-US" i="1" dirty="0">
-                <a:solidFill>
-                  <a:schemeClr val="tx2"/>
-                </a:solidFill>
-              </a:rPr>
-              <a:t>f(x)=y</a:t>
-            </a:r>
-            <a:r>
-              <a:rPr lang="en-US" dirty="0">
-                <a:solidFill>
-                  <a:schemeClr val="tx2"/>
-                </a:solidFill>
-              </a:rPr>
-              <a:t>, then you can substitute </a:t>
-            </a:r>
-            <a:r>
-              <a:rPr lang="en-US" i="1" dirty="0">
-                <a:solidFill>
-                  <a:schemeClr val="tx2"/>
-                </a:solidFill>
-              </a:rPr>
-              <a:t>y</a:t>
-            </a:r>
-            <a:r>
-              <a:rPr lang="en-US" dirty="0">
-                <a:solidFill>
-                  <a:schemeClr val="tx2"/>
-                </a:solidFill>
-              </a:rPr>
-              <a:t> anywhere you see </a:t>
-            </a:r>
-            <a:r>
-              <a:rPr lang="en-US" i="1" dirty="0">
-                <a:solidFill>
-                  <a:schemeClr val="tx2"/>
-                </a:solidFill>
-              </a:rPr>
-              <a:t>f(x)</a:t>
-            </a:r>
-          </a:p>
-          <a:p>
-            <a:pPr lvl="1"/>
-            <a:r>
-              <a:rPr lang="en-US" dirty="0">
-                <a:solidFill>
-                  <a:schemeClr val="tx2"/>
-                </a:solidFill>
-              </a:rPr>
-              <a:t>In imperative languages, you cannot:  </a:t>
-            </a:r>
-            <a:r>
-              <a:rPr lang="en-US" i="1" dirty="0">
-                <a:solidFill>
-                  <a:schemeClr val="tx2"/>
-                </a:solidFill>
-              </a:rPr>
-              <a:t>f</a:t>
-            </a:r>
-            <a:r>
-              <a:rPr lang="en-US" dirty="0">
-                <a:solidFill>
-                  <a:schemeClr val="tx2"/>
-                </a:solidFill>
-              </a:rPr>
-              <a:t> might have side effects, so computing </a:t>
-            </a:r>
-            <a:r>
-              <a:rPr lang="en-US" i="1" dirty="0">
-                <a:solidFill>
-                  <a:schemeClr val="tx2"/>
-                </a:solidFill>
-              </a:rPr>
-              <a:t>f(x)</a:t>
-            </a:r>
-            <a:r>
-              <a:rPr lang="en-US" dirty="0">
-                <a:solidFill>
-                  <a:schemeClr val="tx2"/>
-                </a:solidFill>
-              </a:rPr>
-              <a:t> at time </a:t>
-            </a:r>
-            <a:r>
-              <a:rPr lang="en-US" i="1" dirty="0">
-                <a:solidFill>
-                  <a:schemeClr val="tx2"/>
-                </a:solidFill>
-              </a:rPr>
-              <a:t>t</a:t>
-            </a:r>
-            <a:r>
-              <a:rPr lang="en-US" dirty="0">
-                <a:solidFill>
-                  <a:schemeClr val="tx2"/>
-                </a:solidFill>
-              </a:rPr>
-              <a:t> might result in different value than at time </a:t>
-            </a:r>
-            <a:r>
-              <a:rPr lang="en-US" i="1" dirty="0">
-                <a:solidFill>
-                  <a:schemeClr val="tx2"/>
-                </a:solidFill>
-              </a:rPr>
-              <a:t>t'</a:t>
-            </a:r>
-            <a:endParaRPr lang="en-US" i="1" dirty="0"/>
-          </a:p>
-          <a:p>
-            <a:endParaRPr lang="en-US" dirty="0"/>
+            <a:r>
+              <a:rPr lang="en-US" baseline="0" dirty="0"/>
+              <a:t>Read more about referential transparency in the text book reading for today!</a:t>
+            </a:r>
           </a:p>
         </p:txBody>
       </p:sp>
@@ -3120,7 +3004,7 @@
           <a:p>
             <a:fld id="{96331252-4874-F047-84B8-3D3EF8743E79}" type="datetimeFigureOut">
               <a:rPr lang="en-US" smtClean="0"/>
-              <a:t>8/28/19</a:t>
+              <a:t>8/29/19</a:t>
             </a:fld>
             <a:endParaRPr lang="en-US"/>
           </a:p>
@@ -3387,7 +3271,7 @@
           <a:p>
             <a:fld id="{96331252-4874-F047-84B8-3D3EF8743E79}" type="datetimeFigureOut">
               <a:rPr lang="en-US" smtClean="0"/>
-              <a:t>8/28/19</a:t>
+              <a:t>8/29/19</a:t>
             </a:fld>
             <a:endParaRPr lang="en-US"/>
           </a:p>
@@ -3565,7 +3449,7 @@
           <a:p>
             <a:fld id="{96331252-4874-F047-84B8-3D3EF8743E79}" type="datetimeFigureOut">
               <a:rPr lang="en-US" smtClean="0"/>
-              <a:t>8/28/19</a:t>
+              <a:t>8/29/19</a:t>
             </a:fld>
             <a:endParaRPr lang="en-US"/>
           </a:p>
@@ -3733,7 +3617,7 @@
           <a:p>
             <a:fld id="{96331252-4874-F047-84B8-3D3EF8743E79}" type="datetimeFigureOut">
               <a:rPr lang="en-US" smtClean="0"/>
-              <a:t>8/28/19</a:t>
+              <a:t>8/29/19</a:t>
             </a:fld>
             <a:endParaRPr lang="en-US"/>
           </a:p>
@@ -3978,7 +3862,7 @@
           <a:p>
             <a:fld id="{96331252-4874-F047-84B8-3D3EF8743E79}" type="datetimeFigureOut">
               <a:rPr lang="en-US" smtClean="0"/>
-              <a:t>8/28/19</a:t>
+              <a:t>8/29/19</a:t>
             </a:fld>
             <a:endParaRPr lang="en-US"/>
           </a:p>
@@ -4263,7 +4147,7 @@
           <a:p>
             <a:fld id="{96331252-4874-F047-84B8-3D3EF8743E79}" type="datetimeFigureOut">
               <a:rPr lang="en-US" smtClean="0"/>
-              <a:t>8/28/19</a:t>
+              <a:t>8/29/19</a:t>
             </a:fld>
             <a:endParaRPr lang="en-US"/>
           </a:p>
@@ -4682,7 +4566,7 @@
           <a:p>
             <a:fld id="{96331252-4874-F047-84B8-3D3EF8743E79}" type="datetimeFigureOut">
               <a:rPr lang="en-US" smtClean="0"/>
-              <a:t>8/28/19</a:t>
+              <a:t>8/29/19</a:t>
             </a:fld>
             <a:endParaRPr lang="en-US"/>
           </a:p>
@@ -4799,7 +4683,7 @@
           <a:p>
             <a:fld id="{96331252-4874-F047-84B8-3D3EF8743E79}" type="datetimeFigureOut">
               <a:rPr lang="en-US" smtClean="0"/>
-              <a:t>8/28/19</a:t>
+              <a:t>8/29/19</a:t>
             </a:fld>
             <a:endParaRPr lang="en-US"/>
           </a:p>
@@ -4894,7 +4778,7 @@
           <a:p>
             <a:fld id="{96331252-4874-F047-84B8-3D3EF8743E79}" type="datetimeFigureOut">
               <a:rPr lang="en-US" smtClean="0"/>
-              <a:t>8/28/19</a:t>
+              <a:t>8/29/19</a:t>
             </a:fld>
             <a:endParaRPr lang="en-US"/>
           </a:p>
@@ -5169,7 +5053,7 @@
           <a:p>
             <a:fld id="{96331252-4874-F047-84B8-3D3EF8743E79}" type="datetimeFigureOut">
               <a:rPr lang="en-US" smtClean="0"/>
-              <a:t>8/28/19</a:t>
+              <a:t>8/29/19</a:t>
             </a:fld>
             <a:endParaRPr lang="en-US"/>
           </a:p>
@@ -5421,7 +5305,7 @@
           <a:p>
             <a:fld id="{96331252-4874-F047-84B8-3D3EF8743E79}" type="datetimeFigureOut">
               <a:rPr lang="en-US" smtClean="0"/>
-              <a:t>8/28/19</a:t>
+              <a:t>8/29/19</a:t>
             </a:fld>
             <a:endParaRPr lang="en-US"/>
           </a:p>
@@ -5635,7 +5519,7 @@
             <a:fld id="{96331252-4874-F047-84B8-3D3EF8743E79}" type="datetimeFigureOut">
               <a:rPr lang="en-US" smtClean="0"/>
               <a:pPr/>
-              <a:t>8/28/19</a:t>
+              <a:t>8/29/19</a:t>
             </a:fld>
             <a:endParaRPr lang="en-US"/>
           </a:p>
@@ -12584,7 +12468,7 @@
         <p:spPr>
           <a:xfrm>
             <a:off x="573206" y="682388"/>
-            <a:ext cx="8229600" cy="5513696"/>
+            <a:ext cx="8229600" cy="5295331"/>
           </a:xfrm>
           <a:prstGeom prst="rect">
             <a:avLst/>

</xml_diff>